<commit_message>
Added cookie capture, reload time, source page url, and start of CloudFormation template which creates CloudFront and S3 objects with correct CORS config
</commit_message>
<xml_diff>
--- a/AWS-receiver/AWS Architecture Diagram.pptx
+++ b/AWS-receiver/AWS Architecture Diagram.pptx
@@ -345,7 +345,7 @@
             <a:fld id="{0B25AC41-3BEC-9247-8322-91B80C013F2D}" type="datetimeFigureOut">
               <a:rPr lang="en-US" smtClean="0"/>
               <a:pPr/>
-              <a:t>4/30/2018</a:t>
+              <a:t>5/4/2018</a:t>
             </a:fld>
             <a:endParaRPr lang="en-US" dirty="0"/>
           </a:p>
@@ -4487,7 +4487,7 @@
         </p:nvCxnSpPr>
         <p:spPr>
           <a:xfrm flipH="1">
-            <a:off x="3068649" y="3900472"/>
+            <a:off x="3068649" y="4033952"/>
             <a:ext cx="1753946" cy="0"/>
           </a:xfrm>
           <a:prstGeom prst="straightConnector1">
@@ -4520,7 +4520,7 @@
         </p:nvSpPr>
         <p:spPr>
           <a:xfrm>
-            <a:off x="4194822" y="1748085"/>
+            <a:off x="4194822" y="1914935"/>
             <a:ext cx="2532597" cy="276999"/>
           </a:xfrm>
           <a:prstGeom prst="rect">
@@ -4540,7 +4540,7 @@
                 <a:latin typeface="Helvetica Neue"/>
                 <a:cs typeface="Helvetica Neue"/>
               </a:rPr>
-              <a:t>www.example.com/pixel.png</a:t>
+              <a:t>www.example2.com/pixel.png</a:t>
             </a:r>
           </a:p>
         </p:txBody>
@@ -4553,7 +4553,7 @@
         </p:nvSpPr>
         <p:spPr>
           <a:xfrm>
-            <a:off x="5542076" y="4164025"/>
+            <a:off x="5542076" y="4297505"/>
             <a:ext cx="768159" cy="461665"/>
           </a:xfrm>
           <a:prstGeom prst="rect">
@@ -4609,7 +4609,7 @@
         </p:nvSpPr>
         <p:spPr>
           <a:xfrm>
-            <a:off x="4917168" y="3294547"/>
+            <a:off x="4917168" y="3428027"/>
             <a:ext cx="1087906" cy="338554"/>
           </a:xfrm>
           <a:prstGeom prst="rect">
@@ -4656,8 +4656,8 @@
         </p:nvCxnSpPr>
         <p:spPr>
           <a:xfrm flipH="1" flipV="1">
-            <a:off x="5461121" y="2025084"/>
-            <a:ext cx="5252" cy="738379"/>
+            <a:off x="5461121" y="2191934"/>
+            <a:ext cx="5252" cy="705009"/>
           </a:xfrm>
           <a:prstGeom prst="line">
             <a:avLst/>
@@ -4706,7 +4706,7 @@
         </p:blipFill>
         <p:spPr>
           <a:xfrm>
-            <a:off x="5213913" y="2763463"/>
+            <a:off x="5213913" y="2896943"/>
             <a:ext cx="504920" cy="521207"/>
           </a:xfrm>
           <a:prstGeom prst="rect">
@@ -4736,7 +4736,7 @@
         </p:blipFill>
         <p:spPr>
           <a:xfrm>
-            <a:off x="5235933" y="2131993"/>
+            <a:off x="5235933" y="2265473"/>
             <a:ext cx="450376" cy="534821"/>
           </a:xfrm>
           <a:prstGeom prst="rect">
@@ -4766,7 +4766,7 @@
         </p:blipFill>
         <p:spPr>
           <a:xfrm>
-            <a:off x="5671709" y="3658809"/>
+            <a:off x="5671709" y="3792289"/>
             <a:ext cx="468336" cy="485681"/>
           </a:xfrm>
           <a:prstGeom prst="rect">
@@ -4818,7 +4818,7 @@
         </p:nvSpPr>
         <p:spPr>
           <a:xfrm>
-            <a:off x="4504027" y="2230126"/>
+            <a:off x="4504027" y="2363606"/>
             <a:ext cx="999021" cy="338554"/>
           </a:xfrm>
           <a:prstGeom prst="rect">
@@ -4870,7 +4870,7 @@
         </p:nvSpPr>
         <p:spPr>
           <a:xfrm>
-            <a:off x="4692962" y="4162847"/>
+            <a:off x="4692962" y="4296327"/>
             <a:ext cx="768159" cy="461665"/>
           </a:xfrm>
           <a:prstGeom prst="rect">
@@ -4946,7 +4946,7 @@
         </p:blipFill>
         <p:spPr>
           <a:xfrm>
-            <a:off x="4822595" y="3657631"/>
+            <a:off x="4822595" y="3791111"/>
             <a:ext cx="468336" cy="485681"/>
           </a:xfrm>
           <a:prstGeom prst="rect">
@@ -4971,7 +4971,7 @@
         </p:nvCxnSpPr>
         <p:spPr>
           <a:xfrm rot="16200000" flipV="1">
-            <a:off x="5494984" y="3247916"/>
+            <a:off x="5494984" y="3381396"/>
             <a:ext cx="634742" cy="187044"/>
           </a:xfrm>
           <a:prstGeom prst="bentConnector2">
@@ -5015,7 +5015,7 @@
         </p:nvCxnSpPr>
         <p:spPr>
           <a:xfrm rot="5400000" flipH="1" flipV="1">
-            <a:off x="4818556" y="3262274"/>
+            <a:off x="4818556" y="3395754"/>
             <a:ext cx="633564" cy="157150"/>
           </a:xfrm>
           <a:prstGeom prst="bentConnector2">
@@ -5055,7 +5055,7 @@
         </p:nvSpPr>
         <p:spPr>
           <a:xfrm>
-            <a:off x="3681962" y="4334403"/>
+            <a:off x="3681962" y="4467883"/>
             <a:ext cx="636547" cy="274320"/>
           </a:xfrm>
           <a:prstGeom prst="rect">
@@ -5106,7 +5106,7 @@
         </p:blipFill>
         <p:spPr>
           <a:xfrm>
-            <a:off x="3728416" y="3657631"/>
+            <a:off x="3728416" y="3791111"/>
             <a:ext cx="543639" cy="564959"/>
           </a:xfrm>
           <a:prstGeom prst="rect">
@@ -5128,7 +5128,7 @@
         </p:nvSpPr>
         <p:spPr>
           <a:xfrm>
-            <a:off x="2470680" y="4162847"/>
+            <a:off x="2470680" y="4296327"/>
             <a:ext cx="768159" cy="461665"/>
           </a:xfrm>
           <a:prstGeom prst="rect">
@@ -5204,7 +5204,7 @@
         </p:blipFill>
         <p:spPr>
           <a:xfrm>
-            <a:off x="2600313" y="3657631"/>
+            <a:off x="2600313" y="3791111"/>
             <a:ext cx="468336" cy="485681"/>
           </a:xfrm>
           <a:prstGeom prst="rect">
@@ -5240,7 +5240,7 @@
         </p:blipFill>
         <p:spPr>
           <a:xfrm>
-            <a:off x="2562835" y="1789002"/>
+            <a:off x="2562835" y="1922482"/>
             <a:ext cx="543292" cy="540096"/>
           </a:xfrm>
           <a:prstGeom prst="rect">
@@ -5262,7 +5262,7 @@
         </p:nvSpPr>
         <p:spPr>
           <a:xfrm>
-            <a:off x="2940433" y="1848364"/>
+            <a:off x="2940433" y="1981844"/>
             <a:ext cx="1097280" cy="155632"/>
           </a:xfrm>
           <a:prstGeom prst="rect">
@@ -5309,7 +5309,7 @@
         </p:nvCxnSpPr>
         <p:spPr>
           <a:xfrm>
-            <a:off x="2834481" y="2329098"/>
+            <a:off x="2834481" y="2462578"/>
             <a:ext cx="0" cy="1328533"/>
           </a:xfrm>
           <a:prstGeom prst="straightConnector1">
@@ -5362,7 +5362,7 @@
         </p:blipFill>
         <p:spPr>
           <a:xfrm>
-            <a:off x="5095361" y="524906"/>
+            <a:off x="5095361" y="277955"/>
             <a:ext cx="731520" cy="707136"/>
           </a:xfrm>
           <a:prstGeom prst="rect">
@@ -5464,7 +5464,7 @@
         <p:spPr>
           <a:xfrm flipH="1">
             <a:off x="2834481" y="1174070"/>
-            <a:ext cx="2674" cy="614932"/>
+            <a:ext cx="2674" cy="748412"/>
           </a:xfrm>
           <a:prstGeom prst="straightConnector1">
             <a:avLst/>
@@ -5502,7 +5502,7 @@
         </p:nvSpPr>
         <p:spPr>
           <a:xfrm>
-            <a:off x="5562887" y="809536"/>
+            <a:off x="5562887" y="562585"/>
             <a:ext cx="1078992" cy="155448"/>
           </a:xfrm>
           <a:prstGeom prst="rect">
@@ -5566,7 +5566,7 @@
         </p:blipFill>
         <p:spPr bwMode="auto">
           <a:xfrm>
-            <a:off x="5197626" y="1258281"/>
+            <a:off x="5197626" y="1011330"/>
             <a:ext cx="521207" cy="521207"/>
           </a:xfrm>
           <a:prstGeom prst="rect">
@@ -5612,7 +5612,7 @@
         </p:blipFill>
         <p:spPr>
           <a:xfrm>
-            <a:off x="5586021" y="2626113"/>
+            <a:off x="5586021" y="2759593"/>
             <a:ext cx="379401" cy="321916"/>
           </a:xfrm>
           <a:prstGeom prst="rect">
@@ -5634,7 +5634,7 @@
         </p:nvSpPr>
         <p:spPr>
           <a:xfrm>
-            <a:off x="5928325" y="2649911"/>
+            <a:off x="5928325" y="2783391"/>
             <a:ext cx="640080" cy="274320"/>
           </a:xfrm>
           <a:prstGeom prst="rect">
@@ -5696,7 +5696,7 @@
         </p:blipFill>
         <p:spPr bwMode="auto">
           <a:xfrm>
-            <a:off x="5787144" y="3816911"/>
+            <a:off x="5787144" y="3950391"/>
             <a:ext cx="260755" cy="260755"/>
           </a:xfrm>
           <a:prstGeom prst="rect">
@@ -5728,7 +5728,7 @@
         </p:nvSpPr>
         <p:spPr>
           <a:xfrm>
-            <a:off x="5904964" y="3824767"/>
+            <a:off x="5904964" y="3958247"/>
             <a:ext cx="1078992" cy="155448"/>
           </a:xfrm>
           <a:prstGeom prst="rect">
@@ -5767,7 +5767,7 @@
         </p:nvSpPr>
         <p:spPr>
           <a:xfrm>
-            <a:off x="6948696" y="241281"/>
+            <a:off x="360866" y="167300"/>
             <a:ext cx="805937" cy="274320"/>
           </a:xfrm>
           <a:prstGeom prst="rect">
@@ -5826,7 +5826,7 @@
         </p:blipFill>
         <p:spPr>
           <a:xfrm>
-            <a:off x="7092971" y="516531"/>
+            <a:off x="505141" y="442550"/>
             <a:ext cx="469638" cy="535388"/>
           </a:xfrm>
           <a:prstGeom prst="rect">
@@ -5848,7 +5848,7 @@
         </p:nvSpPr>
         <p:spPr>
           <a:xfrm>
-            <a:off x="7273666" y="1167839"/>
+            <a:off x="685836" y="1093858"/>
             <a:ext cx="636547" cy="274320"/>
           </a:xfrm>
           <a:prstGeom prst="rect">
@@ -5906,7 +5906,7 @@
         </p:blipFill>
         <p:spPr>
           <a:xfrm>
-            <a:off x="7434174" y="831052"/>
+            <a:off x="846344" y="757071"/>
             <a:ext cx="315533" cy="327907"/>
           </a:xfrm>
           <a:prstGeom prst="rect">
@@ -5914,6 +5914,468 @@
           </a:prstGeom>
         </p:spPr>
       </p:pic>
+      <p:sp>
+        <p:nvSpPr>
+          <p:cNvPr id="3" name="Flowchart: Card 2">
+            <a:extLst>
+              <a:ext uri="{FF2B5EF4-FFF2-40B4-BE49-F238E27FC236}">
+                <a16:creationId xmlns:a16="http://schemas.microsoft.com/office/drawing/2014/main" id="{652A1B50-F320-4F2D-8035-780A007F69E2}"/>
+              </a:ext>
+            </a:extLst>
+          </p:cNvPr>
+          <p:cNvSpPr/>
+          <p:nvPr/>
+        </p:nvSpPr>
+        <p:spPr>
+          <a:xfrm>
+            <a:off x="7450000" y="402310"/>
+            <a:ext cx="847656" cy="590083"/>
+          </a:xfrm>
+          <a:prstGeom prst="flowChartPunchedCard">
+            <a:avLst/>
+          </a:prstGeom>
+          <a:ln/>
+        </p:spPr>
+        <p:style>
+          <a:lnRef idx="2">
+            <a:schemeClr val="accent1">
+              <a:shade val="50000"/>
+            </a:schemeClr>
+          </a:lnRef>
+          <a:fillRef idx="1">
+            <a:schemeClr val="accent1"/>
+          </a:fillRef>
+          <a:effectRef idx="0">
+            <a:schemeClr val="accent1"/>
+          </a:effectRef>
+          <a:fontRef idx="minor">
+            <a:schemeClr val="lt1"/>
+          </a:fontRef>
+        </p:style>
+        <p:txBody>
+          <a:bodyPr rtlCol="0" anchor="ctr"/>
+          <a:lstStyle/>
+          <a:p>
+            <a:pPr algn="ctr"/>
+            <a:r>
+              <a:rPr lang="en-GB" dirty="0"/>
+              <a:t>https</a:t>
+            </a:r>
+          </a:p>
+        </p:txBody>
+      </p:sp>
+      <p:sp>
+        <p:nvSpPr>
+          <p:cNvPr id="38" name="Flowchart: Card 37">
+            <a:extLst>
+              <a:ext uri="{FF2B5EF4-FFF2-40B4-BE49-F238E27FC236}">
+                <a16:creationId xmlns:a16="http://schemas.microsoft.com/office/drawing/2014/main" id="{331A9469-3DF0-4353-9773-285BD6DB44CF}"/>
+              </a:ext>
+            </a:extLst>
+          </p:cNvPr>
+          <p:cNvSpPr/>
+          <p:nvPr/>
+        </p:nvSpPr>
+        <p:spPr>
+          <a:xfrm>
+            <a:off x="7450000" y="1073136"/>
+            <a:ext cx="847656" cy="590083"/>
+          </a:xfrm>
+          <a:prstGeom prst="flowChartPunchedCard">
+            <a:avLst/>
+          </a:prstGeom>
+          <a:ln/>
+        </p:spPr>
+        <p:style>
+          <a:lnRef idx="1">
+            <a:schemeClr val="accent3"/>
+          </a:lnRef>
+          <a:fillRef idx="2">
+            <a:schemeClr val="accent3"/>
+          </a:fillRef>
+          <a:effectRef idx="1">
+            <a:schemeClr val="accent3"/>
+          </a:effectRef>
+          <a:fontRef idx="minor">
+            <a:schemeClr val="dk1"/>
+          </a:fontRef>
+        </p:style>
+        <p:txBody>
+          <a:bodyPr rtlCol="0" anchor="ctr"/>
+          <a:lstStyle/>
+          <a:p>
+            <a:pPr algn="ctr"/>
+            <a:r>
+              <a:rPr lang="en-GB" dirty="0"/>
+              <a:t>https</a:t>
+            </a:r>
+          </a:p>
+        </p:txBody>
+      </p:sp>
+      <p:sp>
+        <p:nvSpPr>
+          <p:cNvPr id="40" name="Flowchart: Card 39">
+            <a:extLst>
+              <a:ext uri="{FF2B5EF4-FFF2-40B4-BE49-F238E27FC236}">
+                <a16:creationId xmlns:a16="http://schemas.microsoft.com/office/drawing/2014/main" id="{0814D394-EE87-4CAF-A344-01073C40B482}"/>
+              </a:ext>
+            </a:extLst>
+          </p:cNvPr>
+          <p:cNvSpPr/>
+          <p:nvPr/>
+        </p:nvSpPr>
+        <p:spPr>
+          <a:xfrm>
+            <a:off x="7439691" y="1748085"/>
+            <a:ext cx="847656" cy="590083"/>
+          </a:xfrm>
+          <a:prstGeom prst="flowChartPunchedCard">
+            <a:avLst/>
+          </a:prstGeom>
+          <a:ln/>
+        </p:spPr>
+        <p:style>
+          <a:lnRef idx="1">
+            <a:schemeClr val="accent4"/>
+          </a:lnRef>
+          <a:fillRef idx="2">
+            <a:schemeClr val="accent4"/>
+          </a:fillRef>
+          <a:effectRef idx="1">
+            <a:schemeClr val="accent4"/>
+          </a:effectRef>
+          <a:fontRef idx="minor">
+            <a:schemeClr val="dk1"/>
+          </a:fontRef>
+        </p:style>
+        <p:txBody>
+          <a:bodyPr rtlCol="0" anchor="ctr"/>
+          <a:lstStyle/>
+          <a:p>
+            <a:pPr algn="ctr"/>
+            <a:r>
+              <a:rPr lang="en-GB" dirty="0"/>
+              <a:t>http</a:t>
+            </a:r>
+          </a:p>
+        </p:txBody>
+      </p:sp>
+      <p:cxnSp>
+        <p:nvCxnSpPr>
+          <p:cNvPr id="5" name="Straight Arrow Connector 4">
+            <a:extLst>
+              <a:ext uri="{FF2B5EF4-FFF2-40B4-BE49-F238E27FC236}">
+                <a16:creationId xmlns:a16="http://schemas.microsoft.com/office/drawing/2014/main" id="{71E86F8B-BAF9-42DF-919C-CC68235B71DA}"/>
+              </a:ext>
+            </a:extLst>
+          </p:cNvPr>
+          <p:cNvCxnSpPr>
+            <a:cxnSpLocks/>
+            <a:stCxn id="18" idx="3"/>
+            <a:endCxn id="3" idx="1"/>
+          </p:cNvCxnSpPr>
+          <p:nvPr/>
+        </p:nvCxnSpPr>
+        <p:spPr>
+          <a:xfrm flipV="1">
+            <a:off x="6420768" y="697352"/>
+            <a:ext cx="1029232" cy="940307"/>
+          </a:xfrm>
+          <a:prstGeom prst="straightConnector1">
+            <a:avLst/>
+          </a:prstGeom>
+          <a:ln>
+            <a:solidFill>
+              <a:srgbClr val="FF0000"/>
+            </a:solidFill>
+            <a:tailEnd type="triangle"/>
+          </a:ln>
+        </p:spPr>
+        <p:style>
+          <a:lnRef idx="2">
+            <a:schemeClr val="accent1"/>
+          </a:lnRef>
+          <a:fillRef idx="0">
+            <a:schemeClr val="accent1"/>
+          </a:fillRef>
+          <a:effectRef idx="1">
+            <a:schemeClr val="accent1"/>
+          </a:effectRef>
+          <a:fontRef idx="minor">
+            <a:schemeClr val="tx1"/>
+          </a:fontRef>
+        </p:style>
+      </p:cxnSp>
+      <p:cxnSp>
+        <p:nvCxnSpPr>
+          <p:cNvPr id="44" name="Straight Arrow Connector 43">
+            <a:extLst>
+              <a:ext uri="{FF2B5EF4-FFF2-40B4-BE49-F238E27FC236}">
+                <a16:creationId xmlns:a16="http://schemas.microsoft.com/office/drawing/2014/main" id="{718639FE-77CE-4140-BA13-F604ABF798A9}"/>
+              </a:ext>
+            </a:extLst>
+          </p:cNvPr>
+          <p:cNvCxnSpPr>
+            <a:cxnSpLocks/>
+            <a:stCxn id="18" idx="3"/>
+            <a:endCxn id="38" idx="1"/>
+          </p:cNvCxnSpPr>
+          <p:nvPr/>
+        </p:nvCxnSpPr>
+        <p:spPr>
+          <a:xfrm flipV="1">
+            <a:off x="6420768" y="1368178"/>
+            <a:ext cx="1029232" cy="269481"/>
+          </a:xfrm>
+          <a:prstGeom prst="straightConnector1">
+            <a:avLst/>
+          </a:prstGeom>
+          <a:ln>
+            <a:solidFill>
+              <a:srgbClr val="FF0000"/>
+            </a:solidFill>
+            <a:tailEnd type="triangle"/>
+          </a:ln>
+        </p:spPr>
+        <p:style>
+          <a:lnRef idx="2">
+            <a:schemeClr val="accent1"/>
+          </a:lnRef>
+          <a:fillRef idx="0">
+            <a:schemeClr val="accent1"/>
+          </a:fillRef>
+          <a:effectRef idx="1">
+            <a:schemeClr val="accent1"/>
+          </a:effectRef>
+          <a:fontRef idx="minor">
+            <a:schemeClr val="tx1"/>
+          </a:fontRef>
+        </p:style>
+      </p:cxnSp>
+      <p:cxnSp>
+        <p:nvCxnSpPr>
+          <p:cNvPr id="46" name="Straight Arrow Connector 45">
+            <a:extLst>
+              <a:ext uri="{FF2B5EF4-FFF2-40B4-BE49-F238E27FC236}">
+                <a16:creationId xmlns:a16="http://schemas.microsoft.com/office/drawing/2014/main" id="{F53C773D-450B-420D-A5C3-95B87A8C6373}"/>
+              </a:ext>
+            </a:extLst>
+          </p:cNvPr>
+          <p:cNvCxnSpPr>
+            <a:cxnSpLocks/>
+            <a:stCxn id="18" idx="3"/>
+            <a:endCxn id="40" idx="1"/>
+          </p:cNvCxnSpPr>
+          <p:nvPr/>
+        </p:nvCxnSpPr>
+        <p:spPr>
+          <a:xfrm>
+            <a:off x="6420768" y="1637659"/>
+            <a:ext cx="1018923" cy="405468"/>
+          </a:xfrm>
+          <a:prstGeom prst="straightConnector1">
+            <a:avLst/>
+          </a:prstGeom>
+          <a:ln>
+            <a:solidFill>
+              <a:srgbClr val="FF0000"/>
+            </a:solidFill>
+            <a:tailEnd type="triangle"/>
+          </a:ln>
+        </p:spPr>
+        <p:style>
+          <a:lnRef idx="2">
+            <a:schemeClr val="accent1"/>
+          </a:lnRef>
+          <a:fillRef idx="0">
+            <a:schemeClr val="accent1"/>
+          </a:fillRef>
+          <a:effectRef idx="1">
+            <a:schemeClr val="accent1"/>
+          </a:effectRef>
+          <a:fontRef idx="minor">
+            <a:schemeClr val="tx1"/>
+          </a:fontRef>
+        </p:style>
+      </p:cxnSp>
+      <p:sp>
+        <p:nvSpPr>
+          <p:cNvPr id="49" name="Flowchart: Card 48">
+            <a:extLst>
+              <a:ext uri="{FF2B5EF4-FFF2-40B4-BE49-F238E27FC236}">
+                <a16:creationId xmlns:a16="http://schemas.microsoft.com/office/drawing/2014/main" id="{D033EE70-B799-4D33-AF7C-10B657EB895F}"/>
+              </a:ext>
+            </a:extLst>
+          </p:cNvPr>
+          <p:cNvSpPr/>
+          <p:nvPr/>
+        </p:nvSpPr>
+        <p:spPr>
+          <a:xfrm>
+            <a:off x="7450000" y="2423033"/>
+            <a:ext cx="847656" cy="590083"/>
+          </a:xfrm>
+          <a:prstGeom prst="flowChartPunchedCard">
+            <a:avLst/>
+          </a:prstGeom>
+          <a:ln/>
+        </p:spPr>
+        <p:style>
+          <a:lnRef idx="1">
+            <a:schemeClr val="accent5"/>
+          </a:lnRef>
+          <a:fillRef idx="2">
+            <a:schemeClr val="accent5"/>
+          </a:fillRef>
+          <a:effectRef idx="1">
+            <a:schemeClr val="accent5"/>
+          </a:effectRef>
+          <a:fontRef idx="minor">
+            <a:schemeClr val="dk1"/>
+          </a:fontRef>
+        </p:style>
+        <p:txBody>
+          <a:bodyPr rtlCol="0" anchor="ctr"/>
+          <a:lstStyle/>
+          <a:p>
+            <a:pPr algn="ctr"/>
+            <a:r>
+              <a:rPr lang="en-GB" dirty="0"/>
+              <a:t>https</a:t>
+            </a:r>
+          </a:p>
+        </p:txBody>
+      </p:sp>
+      <p:cxnSp>
+        <p:nvCxnSpPr>
+          <p:cNvPr id="50" name="Straight Arrow Connector 49">
+            <a:extLst>
+              <a:ext uri="{FF2B5EF4-FFF2-40B4-BE49-F238E27FC236}">
+                <a16:creationId xmlns:a16="http://schemas.microsoft.com/office/drawing/2014/main" id="{664EA404-D336-4CF7-951D-3FA93C5354A8}"/>
+              </a:ext>
+            </a:extLst>
+          </p:cNvPr>
+          <p:cNvCxnSpPr>
+            <a:cxnSpLocks/>
+            <a:stCxn id="18" idx="3"/>
+            <a:endCxn id="49" idx="1"/>
+          </p:cNvCxnSpPr>
+          <p:nvPr/>
+        </p:nvCxnSpPr>
+        <p:spPr>
+          <a:xfrm>
+            <a:off x="6420768" y="1637659"/>
+            <a:ext cx="1029232" cy="1080416"/>
+          </a:xfrm>
+          <a:prstGeom prst="straightConnector1">
+            <a:avLst/>
+          </a:prstGeom>
+          <a:ln>
+            <a:solidFill>
+              <a:srgbClr val="FF0000"/>
+            </a:solidFill>
+            <a:tailEnd type="triangle"/>
+          </a:ln>
+        </p:spPr>
+        <p:style>
+          <a:lnRef idx="2">
+            <a:schemeClr val="accent1"/>
+          </a:lnRef>
+          <a:fillRef idx="0">
+            <a:schemeClr val="accent1"/>
+          </a:fillRef>
+          <a:effectRef idx="1">
+            <a:schemeClr val="accent1"/>
+          </a:effectRef>
+          <a:fontRef idx="minor">
+            <a:schemeClr val="tx1"/>
+          </a:fontRef>
+        </p:style>
+      </p:cxnSp>
+      <p:sp>
+        <p:nvSpPr>
+          <p:cNvPr id="18" name="Rectangle 17">
+            <a:extLst>
+              <a:ext uri="{FF2B5EF4-FFF2-40B4-BE49-F238E27FC236}">
+                <a16:creationId xmlns:a16="http://schemas.microsoft.com/office/drawing/2014/main" id="{9AFDB9FA-CFB8-4917-85B2-5E1C6186AE1B}"/>
+              </a:ext>
+            </a:extLst>
+          </p:cNvPr>
+          <p:cNvSpPr/>
+          <p:nvPr/>
+        </p:nvSpPr>
+        <p:spPr>
+          <a:xfrm>
+            <a:off x="4495690" y="1499159"/>
+            <a:ext cx="1925078" cy="276999"/>
+          </a:xfrm>
+          <a:prstGeom prst="rect">
+            <a:avLst/>
+          </a:prstGeom>
+        </p:spPr>
+        <p:txBody>
+          <a:bodyPr wrap="none">
+            <a:spAutoFit/>
+          </a:bodyPr>
+          <a:lstStyle/>
+          <a:p>
+            <a:pPr algn="ctr"/>
+            <a:r>
+              <a:rPr lang="en-US" sz="1200" dirty="0">
+                <a:latin typeface="Helvetica Neue"/>
+                <a:cs typeface="Helvetica Neue"/>
+              </a:rPr>
+              <a:t>www.example.com/rum.js</a:t>
+            </a:r>
+          </a:p>
+        </p:txBody>
+      </p:sp>
+      <p:cxnSp>
+        <p:nvCxnSpPr>
+          <p:cNvPr id="62" name="Straight Arrow Connector 61">
+            <a:extLst>
+              <a:ext uri="{FF2B5EF4-FFF2-40B4-BE49-F238E27FC236}">
+                <a16:creationId xmlns:a16="http://schemas.microsoft.com/office/drawing/2014/main" id="{0E9FB1C7-1C66-4EE6-B382-50336B7440C8}"/>
+              </a:ext>
+            </a:extLst>
+          </p:cNvPr>
+          <p:cNvCxnSpPr>
+            <a:cxnSpLocks/>
+            <a:stCxn id="18" idx="2"/>
+            <a:endCxn id="12" idx="0"/>
+          </p:cNvCxnSpPr>
+          <p:nvPr/>
+        </p:nvCxnSpPr>
+        <p:spPr>
+          <a:xfrm>
+            <a:off x="5458229" y="1776158"/>
+            <a:ext cx="2892" cy="138777"/>
+          </a:xfrm>
+          <a:prstGeom prst="straightConnector1">
+            <a:avLst/>
+          </a:prstGeom>
+          <a:ln>
+            <a:solidFill>
+              <a:srgbClr val="FF0000"/>
+            </a:solidFill>
+            <a:tailEnd type="triangle"/>
+          </a:ln>
+        </p:spPr>
+        <p:style>
+          <a:lnRef idx="2">
+            <a:schemeClr val="accent1"/>
+          </a:lnRef>
+          <a:fillRef idx="0">
+            <a:schemeClr val="accent1"/>
+          </a:fillRef>
+          <a:effectRef idx="1">
+            <a:schemeClr val="accent1"/>
+          </a:effectRef>
+          <a:fontRef idx="minor">
+            <a:schemeClr val="tx1"/>
+          </a:fontRef>
+        </p:style>
+      </p:cxnSp>
     </p:spTree>
     <p:extLst>
       <p:ext uri="{BB962C8B-B14F-4D97-AF65-F5344CB8AC3E}">
@@ -6585,9 +7047,12 @@
 </file>
 
 <file path=customXml/item1.xml><?xml version="1.0" encoding="utf-8"?>
-<p:properties xmlns:p="http://schemas.microsoft.com/office/2006/metadata/properties" xmlns:xsi="http://www.w3.org/2001/XMLSchema-instance">
-  <documentManagement/>
-</p:properties>
+<?mso-contentType ?>
+<FormTemplates xmlns="http://schemas.microsoft.com/sharepoint/v3/contenttype/forms">
+  <Display>DocumentLibraryForm</Display>
+  <Edit>DocumentLibraryForm</Edit>
+  <New>DocumentLibraryForm</New>
+</FormTemplates>
 </file>
 
 <file path=customXml/item2.xml><?xml version="1.0" encoding="utf-8"?>
@@ -6705,25 +7170,15 @@
 </file>
 
 <file path=customXml/item3.xml><?xml version="1.0" encoding="utf-8"?>
-<?mso-contentType ?>
-<FormTemplates xmlns="http://schemas.microsoft.com/sharepoint/v3/contenttype/forms">
-  <Display>DocumentLibraryForm</Display>
-  <Edit>DocumentLibraryForm</Edit>
-  <New>DocumentLibraryForm</New>
-</FormTemplates>
+<p:properties xmlns:p="http://schemas.microsoft.com/office/2006/metadata/properties" xmlns:xsi="http://www.w3.org/2001/XMLSchema-instance">
+  <documentManagement/>
+</p:properties>
 </file>
 
 <file path=customXml/itemProps1.xml><?xml version="1.0" encoding="utf-8"?>
-<ds:datastoreItem xmlns:ds="http://schemas.openxmlformats.org/officeDocument/2006/customXml" ds:itemID="{C597C89A-FD0C-431E-81F6-90225B937683}">
+<ds:datastoreItem xmlns:ds="http://schemas.openxmlformats.org/officeDocument/2006/customXml" ds:itemID="{705B35A6-8B52-46A5-AE45-B98C6459DC10}">
   <ds:schemaRefs>
-    <ds:schemaRef ds:uri="http://purl.org/dc/terms/"/>
-    <ds:schemaRef ds:uri="http://schemas.openxmlformats.org/package/2006/metadata/core-properties"/>
-    <ds:schemaRef ds:uri="http://purl.org/dc/dcmitype/"/>
-    <ds:schemaRef ds:uri="http://schemas.microsoft.com/office/infopath/2007/PartnerControls"/>
-    <ds:schemaRef ds:uri="http://schemas.microsoft.com/office/2006/documentManagement/types"/>
-    <ds:schemaRef ds:uri="http://purl.org/dc/elements/1.1/"/>
-    <ds:schemaRef ds:uri="http://schemas.microsoft.com/office/2006/metadata/properties"/>
-    <ds:schemaRef ds:uri="http://www.w3.org/XML/1998/namespace"/>
+    <ds:schemaRef ds:uri="http://schemas.microsoft.com/sharepoint/v3/contenttype/forms"/>
   </ds:schemaRefs>
 </ds:datastoreItem>
 </file>
@@ -6745,9 +7200,16 @@
 </file>
 
 <file path=customXml/itemProps3.xml><?xml version="1.0" encoding="utf-8"?>
-<ds:datastoreItem xmlns:ds="http://schemas.openxmlformats.org/officeDocument/2006/customXml" ds:itemID="{705B35A6-8B52-46A5-AE45-B98C6459DC10}">
+<ds:datastoreItem xmlns:ds="http://schemas.openxmlformats.org/officeDocument/2006/customXml" ds:itemID="{C597C89A-FD0C-431E-81F6-90225B937683}">
   <ds:schemaRefs>
-    <ds:schemaRef ds:uri="http://schemas.microsoft.com/sharepoint/v3/contenttype/forms"/>
+    <ds:schemaRef ds:uri="http://schemas.openxmlformats.org/package/2006/metadata/core-properties"/>
+    <ds:schemaRef ds:uri="http://purl.org/dc/dcmitype/"/>
+    <ds:schemaRef ds:uri="http://schemas.microsoft.com/office/infopath/2007/PartnerControls"/>
+    <ds:schemaRef ds:uri="http://purl.org/dc/elements/1.1/"/>
+    <ds:schemaRef ds:uri="http://schemas.microsoft.com/office/2006/metadata/properties"/>
+    <ds:schemaRef ds:uri="http://schemas.microsoft.com/office/2006/documentManagement/types"/>
+    <ds:schemaRef ds:uri="http://purl.org/dc/terms/"/>
+    <ds:schemaRef ds:uri="http://www.w3.org/XML/1998/namespace"/>
   </ds:schemaRefs>
 </ds:datastoreItem>
 </file>
</xml_diff>